<commit_message>
update intro with classes order change & add laravel
</commit_message>
<xml_diff>
--- a/public/cursus/web-backend-inleiding.pptx
+++ b/public/cursus/web-backend-inleiding.pptx
@@ -441,7 +441,7 @@
           <a:p>
             <a:fld id="{B2F647BE-71A6-4ED4-8BB7-01FED98A37D4}" type="datetimeFigureOut">
               <a:rPr lang="nl-BE" smtClean="0"/>
-              <a:t>13/08/2014</a:t>
+              <a:t>12/11/2014</a:t>
             </a:fld>
             <a:endParaRPr lang="nl-BE"/>
           </a:p>
@@ -780,11 +780,7 @@
             </a:pPr>
             <a:r>
               <a:rPr lang="nl-BE" baseline="0" dirty="0" smtClean="0"/>
-              <a:t>Iets </a:t>
-            </a:r>
-            <a:r>
-              <a:rPr lang="nl-BE" baseline="0" dirty="0" smtClean="0"/>
-              <a:t>meer over hoe te debuggen </a:t>
+              <a:t>Iets meer over hoe te debuggen </a:t>
             </a:r>
             <a:r>
               <a:rPr lang="nl-BE" baseline="0" dirty="0" err="1" smtClean="0"/>
@@ -810,11 +806,7 @@
             </a:pPr>
             <a:r>
               <a:rPr lang="nl-BE" dirty="0" smtClean="0"/>
-              <a:t>http://</a:t>
-            </a:r>
-            <a:r>
-              <a:rPr lang="nl-BE" dirty="0" smtClean="0"/>
-              <a:t>stackoverflow.com/questions/888/how-do-you-debug-php-scripts</a:t>
+              <a:t>http://stackoverflow.com/questions/888/how-do-you-debug-php-scripts</a:t>
             </a:r>
             <a:br>
               <a:rPr lang="nl-BE" dirty="0" smtClean="0"/>
@@ -1468,7 +1460,7 @@
           <a:p>
             <a:fld id="{2C01550C-CE15-4B19-BADE-9E1ED8F159AC}" type="datetimeFigureOut">
               <a:rPr lang="nl-BE" smtClean="0"/>
-              <a:t>13/08/2014</a:t>
+              <a:t>12/11/2014</a:t>
             </a:fld>
             <a:endParaRPr lang="nl-BE"/>
           </a:p>
@@ -1638,7 +1630,7 @@
           <a:p>
             <a:fld id="{2C01550C-CE15-4B19-BADE-9E1ED8F159AC}" type="datetimeFigureOut">
               <a:rPr lang="nl-BE" smtClean="0"/>
-              <a:t>13/08/2014</a:t>
+              <a:t>12/11/2014</a:t>
             </a:fld>
             <a:endParaRPr lang="nl-BE"/>
           </a:p>
@@ -1818,7 +1810,7 @@
           <a:p>
             <a:fld id="{2C01550C-CE15-4B19-BADE-9E1ED8F159AC}" type="datetimeFigureOut">
               <a:rPr lang="nl-BE" smtClean="0"/>
-              <a:t>13/08/2014</a:t>
+              <a:t>12/11/2014</a:t>
             </a:fld>
             <a:endParaRPr lang="nl-BE"/>
           </a:p>
@@ -1988,7 +1980,7 @@
           <a:p>
             <a:fld id="{2C01550C-CE15-4B19-BADE-9E1ED8F159AC}" type="datetimeFigureOut">
               <a:rPr lang="nl-BE" smtClean="0"/>
-              <a:t>13/08/2014</a:t>
+              <a:t>12/11/2014</a:t>
             </a:fld>
             <a:endParaRPr lang="nl-BE"/>
           </a:p>
@@ -2234,7 +2226,7 @@
           <a:p>
             <a:fld id="{2C01550C-CE15-4B19-BADE-9E1ED8F159AC}" type="datetimeFigureOut">
               <a:rPr lang="nl-BE" smtClean="0"/>
-              <a:t>13/08/2014</a:t>
+              <a:t>12/11/2014</a:t>
             </a:fld>
             <a:endParaRPr lang="nl-BE"/>
           </a:p>
@@ -2522,7 +2514,7 @@
           <a:p>
             <a:fld id="{2C01550C-CE15-4B19-BADE-9E1ED8F159AC}" type="datetimeFigureOut">
               <a:rPr lang="nl-BE" smtClean="0"/>
-              <a:t>13/08/2014</a:t>
+              <a:t>12/11/2014</a:t>
             </a:fld>
             <a:endParaRPr lang="nl-BE"/>
           </a:p>
@@ -2944,7 +2936,7 @@
           <a:p>
             <a:fld id="{2C01550C-CE15-4B19-BADE-9E1ED8F159AC}" type="datetimeFigureOut">
               <a:rPr lang="nl-BE" smtClean="0"/>
-              <a:t>13/08/2014</a:t>
+              <a:t>12/11/2014</a:t>
             </a:fld>
             <a:endParaRPr lang="nl-BE"/>
           </a:p>
@@ -3062,7 +3054,7 @@
           <a:p>
             <a:fld id="{2C01550C-CE15-4B19-BADE-9E1ED8F159AC}" type="datetimeFigureOut">
               <a:rPr lang="nl-BE" smtClean="0"/>
-              <a:t>13/08/2014</a:t>
+              <a:t>12/11/2014</a:t>
             </a:fld>
             <a:endParaRPr lang="nl-BE"/>
           </a:p>
@@ -3157,7 +3149,7 @@
           <a:p>
             <a:fld id="{2C01550C-CE15-4B19-BADE-9E1ED8F159AC}" type="datetimeFigureOut">
               <a:rPr lang="nl-BE" smtClean="0"/>
-              <a:t>13/08/2014</a:t>
+              <a:t>12/11/2014</a:t>
             </a:fld>
             <a:endParaRPr lang="nl-BE"/>
           </a:p>
@@ -3434,7 +3426,7 @@
           <a:p>
             <a:fld id="{2C01550C-CE15-4B19-BADE-9E1ED8F159AC}" type="datetimeFigureOut">
               <a:rPr lang="nl-BE" smtClean="0"/>
-              <a:t>13/08/2014</a:t>
+              <a:t>12/11/2014</a:t>
             </a:fld>
             <a:endParaRPr lang="nl-BE"/>
           </a:p>
@@ -3687,7 +3679,7 @@
           <a:p>
             <a:fld id="{2C01550C-CE15-4B19-BADE-9E1ED8F159AC}" type="datetimeFigureOut">
               <a:rPr lang="nl-BE" smtClean="0"/>
-              <a:t>13/08/2014</a:t>
+              <a:t>12/11/2014</a:t>
             </a:fld>
             <a:endParaRPr lang="nl-BE"/>
           </a:p>
@@ -3900,7 +3892,7 @@
           <a:p>
             <a:fld id="{2C01550C-CE15-4B19-BADE-9E1ED8F159AC}" type="datetimeFigureOut">
               <a:rPr lang="nl-BE" smtClean="0"/>
-              <a:t>13/08/2014</a:t>
+              <a:t>12/11/2014</a:t>
             </a:fld>
             <a:endParaRPr lang="nl-BE"/>
           </a:p>
@@ -4800,7 +4792,6 @@
               <a:rPr lang="nl-BE" dirty="0" smtClean="0"/>
               <a:t>) </a:t>
             </a:r>
-            <a:endParaRPr lang="nl-BE" dirty="0" smtClean="0"/>
           </a:p>
           <a:p>
             <a:pPr lvl="1">
@@ -4895,13 +4886,7 @@
               <a:rPr lang="nl-BE" sz="2400" dirty="0" smtClean="0">
                 <a:latin typeface="Lucida Console" panose="020B0609040504020204" pitchFamily="49" charset="0"/>
               </a:rPr>
-              <a:t> Dit is ook </a:t>
-            </a:r>
-            <a:r>
-              <a:rPr lang="nl-BE" sz="2400" dirty="0" smtClean="0">
-                <a:latin typeface="Lucida Console" panose="020B0609040504020204" pitchFamily="49" charset="0"/>
-              </a:rPr>
-              <a:t>commentaar</a:t>
+              <a:t> Dit is ook commentaar</a:t>
             </a:r>
             <a:br>
               <a:rPr lang="nl-BE" sz="2400" dirty="0" smtClean="0">
@@ -7609,7 +7594,6 @@
               <a:rPr lang="nl-BE" dirty="0" smtClean="0"/>
               <a:t>) </a:t>
             </a:r>
-            <a:endParaRPr lang="nl-BE" dirty="0" smtClean="0"/>
           </a:p>
           <a:p>
             <a:endParaRPr lang="nl-BE" b="1" dirty="0"/>
@@ -9970,7 +9954,6 @@
               <a:rPr lang="nl-BE" dirty="0" smtClean="0"/>
               <a:t>)</a:t>
             </a:r>
-            <a:endParaRPr lang="nl-BE" dirty="0" smtClean="0"/>
           </a:p>
           <a:p>
             <a:pPr lvl="3">
@@ -10360,7 +10343,6 @@
               <a:rPr lang="nl-BE" dirty="0" smtClean="0"/>
               <a:t>)</a:t>
             </a:r>
-            <a:endParaRPr lang="nl-BE" dirty="0" smtClean="0"/>
           </a:p>
           <a:p>
             <a:pPr lvl="3">
@@ -10433,7 +10415,6 @@
               <a:rPr lang="nl-BE" dirty="0" smtClean="0"/>
               <a:t>)</a:t>
             </a:r>
-            <a:endParaRPr lang="nl-BE" dirty="0" smtClean="0"/>
           </a:p>
           <a:p>
             <a:pPr lvl="3">
@@ -10866,8 +10847,16 @@
               </a:lnSpc>
             </a:pPr>
             <a:r>
+              <a:rPr lang="nl-BE" sz="2000" dirty="0" err="1" smtClean="0"/>
+              <a:t>float</a:t>
+            </a:r>
+            <a:r>
               <a:rPr lang="nl-BE" sz="2000" dirty="0" smtClean="0"/>
-              <a:t>double: getal met cijfers na het punt (GEEN komma!)</a:t>
+              <a:t>: </a:t>
+            </a:r>
+            <a:r>
+              <a:rPr lang="nl-BE" sz="2000" dirty="0" smtClean="0"/>
+              <a:t>getal met cijfers na het punt (GEEN komma!)</a:t>
             </a:r>
           </a:p>
           <a:p>
@@ -16131,10 +16120,6 @@
               <a:rPr lang="nl-BE" dirty="0" smtClean="0"/>
               <a:t>)</a:t>
             </a:r>
-            <a:r>
-              <a:rPr lang="nl-BE" dirty="0" smtClean="0"/>
-              <a:t/>
-            </a:r>
             <a:br>
               <a:rPr lang="nl-BE" dirty="0" smtClean="0"/>
             </a:br>
@@ -16722,7 +16707,6 @@
               <a:rPr lang="nl-BE" dirty="0" smtClean="0"/>
               <a:t>)</a:t>
             </a:r>
-            <a:endParaRPr lang="nl-BE" dirty="0" smtClean="0"/>
           </a:p>
           <a:p>
             <a:pPr lvl="1">
@@ -17350,7 +17334,6 @@
               <a:rPr lang="nl-BE" dirty="0" smtClean="0"/>
               <a:t>)</a:t>
             </a:r>
-            <a:endParaRPr lang="nl-BE" dirty="0" smtClean="0"/>
           </a:p>
           <a:p>
             <a:pPr marL="457200" lvl="1" indent="0">
@@ -19932,7 +19915,6 @@
               <a:rPr lang="nl-BE" dirty="0" smtClean="0"/>
               <a:t>)</a:t>
             </a:r>
-            <a:endParaRPr lang="nl-BE" dirty="0" smtClean="0"/>
           </a:p>
           <a:p>
             <a:pPr lvl="1">
@@ -22309,10 +22291,6 @@
               <a:rPr lang="nl-BE" sz="2400" dirty="0" smtClean="0"/>
               <a:t>)</a:t>
             </a:r>
-            <a:r>
-              <a:rPr lang="nl-BE" sz="2400" dirty="0" smtClean="0"/>
-              <a:t/>
-            </a:r>
             <a:br>
               <a:rPr lang="nl-BE" sz="2400" dirty="0" smtClean="0"/>
             </a:br>
@@ -23005,10 +22983,6 @@
               <a:rPr lang="nl-BE" sz="2400" dirty="0" smtClean="0"/>
               <a:t>)</a:t>
             </a:r>
-            <a:r>
-              <a:rPr lang="nl-BE" sz="2400" dirty="0" smtClean="0"/>
-              <a:t/>
-            </a:r>
             <a:br>
               <a:rPr lang="nl-BE" sz="2400" dirty="0" smtClean="0"/>
             </a:br>
@@ -23637,10 +23611,6 @@
             <a:r>
               <a:rPr lang="nl-BE" sz="2400" dirty="0" smtClean="0"/>
               <a:t>)</a:t>
-            </a:r>
-            <a:r>
-              <a:rPr lang="nl-BE" sz="2400" dirty="0" smtClean="0"/>
-              <a:t/>
             </a:r>
             <a:br>
               <a:rPr lang="nl-BE" sz="2400" dirty="0" smtClean="0"/>
@@ -27575,7 +27545,6 @@
               <a:rPr lang="nl-BE" dirty="0" smtClean="0"/>
               <a:t>)</a:t>
             </a:r>
-            <a:endParaRPr lang="nl-BE" dirty="0" smtClean="0"/>
           </a:p>
           <a:p>
             <a:pPr lvl="1">
@@ -27687,7 +27656,6 @@
               <a:rPr lang="nl-BE" dirty="0" smtClean="0"/>
               <a:t>)</a:t>
             </a:r>
-            <a:endParaRPr lang="nl-BE" dirty="0" smtClean="0"/>
           </a:p>
           <a:p>
             <a:pPr lvl="1">
@@ -28857,7 +28825,6 @@
               <a:rPr lang="nl-BE" dirty="0" smtClean="0"/>
               <a:t>)</a:t>
             </a:r>
-            <a:endParaRPr lang="nl-BE" dirty="0" smtClean="0"/>
           </a:p>
           <a:p>
             <a:pPr lvl="1">
@@ -29421,7 +29388,6 @@
               <a:rPr lang="nl-BE" dirty="0" smtClean="0"/>
               <a:t>)</a:t>
             </a:r>
-            <a:endParaRPr lang="nl-BE" dirty="0" smtClean="0"/>
           </a:p>
         </p:txBody>
       </p:sp>
@@ -29877,10 +29843,6 @@
               <a:rPr lang="nl-BE" dirty="0" smtClean="0"/>
               <a:t>)</a:t>
             </a:r>
-            <a:r>
-              <a:rPr lang="nl-BE" dirty="0" smtClean="0"/>
-              <a:t/>
-            </a:r>
             <a:br>
               <a:rPr lang="nl-BE" dirty="0" smtClean="0"/>
             </a:br>
@@ -30456,7 +30418,6 @@
               <a:rPr lang="nl-BE" dirty="0" smtClean="0"/>
               <a:t>) </a:t>
             </a:r>
-            <a:endParaRPr lang="nl-BE" dirty="0" smtClean="0"/>
           </a:p>
           <a:p>
             <a:pPr lvl="1">
@@ -30507,7 +30468,6 @@
               <a:rPr lang="nl-BE" dirty="0" smtClean="0"/>
               <a:t>)</a:t>
             </a:r>
-            <a:endParaRPr lang="nl-BE" dirty="0" smtClean="0"/>
           </a:p>
         </p:txBody>
       </p:sp>

</xml_diff>